<commit_message>
Updated presentation and snippets
</commit_message>
<xml_diff>
--- a/ppt/SplunkFundamentals2v1_3.pptx
+++ b/ppt/SplunkFundamentals2v1_3.pptx
@@ -4882,6 +4882,20 @@
           <a:bodyPr/>
           <a:lstStyle/>
           <a:p>
+            <a:r>
+              <a:rPr lang="en-US" dirty="0" smtClean="0"/>
+              <a:t>P. 603</a:t>
+            </a:r>
+          </a:p>
+          <a:p>
+            <a:r>
+              <a:rPr lang="en-US" dirty="0" smtClean="0"/>
+              <a:t>P. </a:t>
+            </a:r>
+            <a:r>
+              <a:rPr lang="en-US" smtClean="0"/>
+              <a:t>627</a:t>
+            </a:r>
             <a:endParaRPr lang="en-US"/>
           </a:p>
         </p:txBody>
@@ -4896,6 +4910,13 @@
   <p:clrMapOvr>
     <a:masterClrMapping/>
   </p:clrMapOvr>
+  <p:timing>
+    <p:tnLst>
+      <p:par>
+        <p:cTn id="1" dur="indefinite" restart="never" nodeType="tmRoot"/>
+      </p:par>
+    </p:tnLst>
+  </p:timing>
 </p:sld>
 </file>
 
@@ -4989,6 +5010,13 @@
   <p:clrMapOvr>
     <a:masterClrMapping/>
   </p:clrMapOvr>
+  <p:timing>
+    <p:tnLst>
+      <p:par>
+        <p:cTn id="1" dur="indefinite" restart="never" nodeType="tmRoot"/>
+      </p:par>
+    </p:tnLst>
+  </p:timing>
 </p:sld>
 </file>
 
@@ -20739,11 +20767,7 @@
             </a:r>
             <a:r>
               <a:rPr lang="en-US" dirty="0" smtClean="0"/>
-              <a:t>30</a:t>
-            </a:r>
-            <a:r>
-              <a:rPr lang="en-US" dirty="0" smtClean="0"/>
-              <a:t> </a:t>
+              <a:t>30 </a:t>
             </a:r>
             <a:r>
               <a:rPr lang="en-US" dirty="0"/>
@@ -21352,6 +21376,13 @@
   <p:clrMapOvr>
     <a:masterClrMapping/>
   </p:clrMapOvr>
+  <p:timing>
+    <p:tnLst>
+      <p:par>
+        <p:cTn id="1" dur="indefinite" restart="never" nodeType="tmRoot"/>
+      </p:par>
+    </p:tnLst>
+  </p:timing>
 </p:sld>
 </file>
 
@@ -21778,7 +21809,6 @@
               <a:rPr lang="en-US" sz="1800" dirty="0"/>
               <a:t>Report acceleration summaries are stored alongside the buckets in your indexes</a:t>
             </a:r>
-            <a:endParaRPr lang="en-US" sz="1800" dirty="0"/>
           </a:p>
         </p:txBody>
       </p:sp>
@@ -21940,6 +21970,706 @@
           </a:p>
         </p:txBody>
       </p:sp>
+      <p:sp>
+        <p:nvSpPr>
+          <p:cNvPr id="5" name="Rectangle 5"/>
+          <p:cNvSpPr>
+            <a:spLocks noChangeArrowheads="1"/>
+          </p:cNvSpPr>
+          <p:nvPr/>
+        </p:nvSpPr>
+        <p:spPr bwMode="auto">
+          <a:xfrm>
+            <a:off x="0" y="0"/>
+            <a:ext cx="12192000" cy="6858000"/>
+          </a:xfrm>
+          <a:prstGeom prst="rect">
+            <a:avLst/>
+          </a:prstGeom>
+          <a:solidFill>
+            <a:srgbClr val="FFFFFF">
+              <a:alpha val="50195"/>
+            </a:srgbClr>
+          </a:solidFill>
+          <a:ln>
+            <a:noFill/>
+          </a:ln>
+          <a:effectLst>
+            <a:outerShdw dist="53882" dir="2700000" algn="ctr" rotWithShape="0">
+              <a:srgbClr val="919191">
+                <a:alpha val="50000"/>
+              </a:srgbClr>
+            </a:outerShdw>
+          </a:effectLst>
+          <a:extLst>
+            <a:ext uri="{91240B29-F687-4F45-9708-019B960494DF}">
+              <a14:hiddenLine xmlns:a14="http://schemas.microsoft.com/office/drawing/2010/main" w="9525" algn="ctr">
+                <a:solidFill>
+                  <a:srgbClr val="000000"/>
+                </a:solidFill>
+                <a:miter lim="800000"/>
+                <a:headEnd/>
+                <a:tailEnd/>
+              </a14:hiddenLine>
+            </a:ext>
+          </a:extLst>
+        </p:spPr>
+        <p:txBody>
+          <a:bodyPr wrap="none" anchor="ctr"/>
+          <a:lstStyle>
+            <a:lvl1pPr>
+              <a:defRPr b="1">
+                <a:solidFill>
+                  <a:schemeClr val="tx1"/>
+                </a:solidFill>
+                <a:latin typeface="Verdana" panose="020B0604030504040204" pitchFamily="34" charset="0"/>
+              </a:defRPr>
+            </a:lvl1pPr>
+            <a:lvl2pPr marL="742950" indent="-285750">
+              <a:defRPr b="1">
+                <a:solidFill>
+                  <a:schemeClr val="tx1"/>
+                </a:solidFill>
+                <a:latin typeface="Verdana" panose="020B0604030504040204" pitchFamily="34" charset="0"/>
+              </a:defRPr>
+            </a:lvl2pPr>
+            <a:lvl3pPr marL="1143000" indent="-228600">
+              <a:defRPr b="1">
+                <a:solidFill>
+                  <a:schemeClr val="tx1"/>
+                </a:solidFill>
+                <a:latin typeface="Verdana" panose="020B0604030504040204" pitchFamily="34" charset="0"/>
+              </a:defRPr>
+            </a:lvl3pPr>
+            <a:lvl4pPr marL="1600200" indent="-228600">
+              <a:defRPr b="1">
+                <a:solidFill>
+                  <a:schemeClr val="tx1"/>
+                </a:solidFill>
+                <a:latin typeface="Verdana" panose="020B0604030504040204" pitchFamily="34" charset="0"/>
+              </a:defRPr>
+            </a:lvl4pPr>
+            <a:lvl5pPr marL="2057400" indent="-228600">
+              <a:defRPr b="1">
+                <a:solidFill>
+                  <a:schemeClr val="tx1"/>
+                </a:solidFill>
+                <a:latin typeface="Verdana" panose="020B0604030504040204" pitchFamily="34" charset="0"/>
+              </a:defRPr>
+            </a:lvl5pPr>
+            <a:lvl6pPr marL="2514600" indent="-228600" eaLnBrk="0" fontAlgn="base" hangingPunct="0">
+              <a:spcBef>
+                <a:spcPct val="0"/>
+              </a:spcBef>
+              <a:spcAft>
+                <a:spcPct val="0"/>
+              </a:spcAft>
+              <a:defRPr b="1">
+                <a:solidFill>
+                  <a:schemeClr val="tx1"/>
+                </a:solidFill>
+                <a:latin typeface="Verdana" panose="020B0604030504040204" pitchFamily="34" charset="0"/>
+              </a:defRPr>
+            </a:lvl6pPr>
+            <a:lvl7pPr marL="2971800" indent="-228600" eaLnBrk="0" fontAlgn="base" hangingPunct="0">
+              <a:spcBef>
+                <a:spcPct val="0"/>
+              </a:spcBef>
+              <a:spcAft>
+                <a:spcPct val="0"/>
+              </a:spcAft>
+              <a:defRPr b="1">
+                <a:solidFill>
+                  <a:schemeClr val="tx1"/>
+                </a:solidFill>
+                <a:latin typeface="Verdana" panose="020B0604030504040204" pitchFamily="34" charset="0"/>
+              </a:defRPr>
+            </a:lvl7pPr>
+            <a:lvl8pPr marL="3429000" indent="-228600" eaLnBrk="0" fontAlgn="base" hangingPunct="0">
+              <a:spcBef>
+                <a:spcPct val="0"/>
+              </a:spcBef>
+              <a:spcAft>
+                <a:spcPct val="0"/>
+              </a:spcAft>
+              <a:defRPr b="1">
+                <a:solidFill>
+                  <a:schemeClr val="tx1"/>
+                </a:solidFill>
+                <a:latin typeface="Verdana" panose="020B0604030504040204" pitchFamily="34" charset="0"/>
+              </a:defRPr>
+            </a:lvl8pPr>
+            <a:lvl9pPr marL="3886200" indent="-228600" eaLnBrk="0" fontAlgn="base" hangingPunct="0">
+              <a:spcBef>
+                <a:spcPct val="0"/>
+              </a:spcBef>
+              <a:spcAft>
+                <a:spcPct val="0"/>
+              </a:spcAft>
+              <a:defRPr b="1">
+                <a:solidFill>
+                  <a:schemeClr val="tx1"/>
+                </a:solidFill>
+                <a:latin typeface="Verdana" panose="020B0604030504040204" pitchFamily="34" charset="0"/>
+              </a:defRPr>
+            </a:lvl9pPr>
+          </a:lstStyle>
+          <a:p>
+            <a:pPr algn="ctr"/>
+            <a:endParaRPr lang="en-US" altLang="en-US"/>
+          </a:p>
+        </p:txBody>
+      </p:sp>
+      <p:sp>
+        <p:nvSpPr>
+          <p:cNvPr id="6" name="Rectangle 6"/>
+          <p:cNvSpPr>
+            <a:spLocks noChangeArrowheads="1"/>
+          </p:cNvSpPr>
+          <p:nvPr/>
+        </p:nvSpPr>
+        <p:spPr bwMode="auto">
+          <a:xfrm>
+            <a:off x="492125" y="5038725"/>
+            <a:ext cx="4094163" cy="1589088"/>
+          </a:xfrm>
+          <a:prstGeom prst="rect">
+            <a:avLst/>
+          </a:prstGeom>
+          <a:solidFill>
+            <a:srgbClr val="FFFFFF"/>
+          </a:solidFill>
+          <a:ln w="9525" algn="ctr">
+            <a:solidFill>
+              <a:schemeClr val="bg2"/>
+            </a:solidFill>
+            <a:miter lim="800000"/>
+            <a:headEnd/>
+            <a:tailEnd/>
+          </a:ln>
+          <a:effectLst>
+            <a:outerShdw dist="53882" dir="2700000" algn="ctr" rotWithShape="0">
+              <a:srgbClr val="919191">
+                <a:alpha val="50000"/>
+              </a:srgbClr>
+            </a:outerShdw>
+          </a:effectLst>
+        </p:spPr>
+        <p:txBody>
+          <a:bodyPr anchor="ctr"/>
+          <a:lstStyle>
+            <a:lvl1pPr>
+              <a:defRPr b="1">
+                <a:solidFill>
+                  <a:schemeClr val="tx1"/>
+                </a:solidFill>
+                <a:latin typeface="Verdana" panose="020B0604030504040204" pitchFamily="34" charset="0"/>
+              </a:defRPr>
+            </a:lvl1pPr>
+            <a:lvl2pPr marL="742950" indent="-285750">
+              <a:defRPr b="1">
+                <a:solidFill>
+                  <a:schemeClr val="tx1"/>
+                </a:solidFill>
+                <a:latin typeface="Verdana" panose="020B0604030504040204" pitchFamily="34" charset="0"/>
+              </a:defRPr>
+            </a:lvl2pPr>
+            <a:lvl3pPr marL="1143000" indent="-228600">
+              <a:defRPr b="1">
+                <a:solidFill>
+                  <a:schemeClr val="tx1"/>
+                </a:solidFill>
+                <a:latin typeface="Verdana" panose="020B0604030504040204" pitchFamily="34" charset="0"/>
+              </a:defRPr>
+            </a:lvl3pPr>
+            <a:lvl4pPr marL="1600200" indent="-228600">
+              <a:defRPr b="1">
+                <a:solidFill>
+                  <a:schemeClr val="tx1"/>
+                </a:solidFill>
+                <a:latin typeface="Verdana" panose="020B0604030504040204" pitchFamily="34" charset="0"/>
+              </a:defRPr>
+            </a:lvl4pPr>
+            <a:lvl5pPr marL="2057400" indent="-228600">
+              <a:defRPr b="1">
+                <a:solidFill>
+                  <a:schemeClr val="tx1"/>
+                </a:solidFill>
+                <a:latin typeface="Verdana" panose="020B0604030504040204" pitchFamily="34" charset="0"/>
+              </a:defRPr>
+            </a:lvl5pPr>
+            <a:lvl6pPr marL="2514600" indent="-228600" eaLnBrk="0" fontAlgn="base" hangingPunct="0">
+              <a:spcBef>
+                <a:spcPct val="0"/>
+              </a:spcBef>
+              <a:spcAft>
+                <a:spcPct val="0"/>
+              </a:spcAft>
+              <a:defRPr b="1">
+                <a:solidFill>
+                  <a:schemeClr val="tx1"/>
+                </a:solidFill>
+                <a:latin typeface="Verdana" panose="020B0604030504040204" pitchFamily="34" charset="0"/>
+              </a:defRPr>
+            </a:lvl6pPr>
+            <a:lvl7pPr marL="2971800" indent="-228600" eaLnBrk="0" fontAlgn="base" hangingPunct="0">
+              <a:spcBef>
+                <a:spcPct val="0"/>
+              </a:spcBef>
+              <a:spcAft>
+                <a:spcPct val="0"/>
+              </a:spcAft>
+              <a:defRPr b="1">
+                <a:solidFill>
+                  <a:schemeClr val="tx1"/>
+                </a:solidFill>
+                <a:latin typeface="Verdana" panose="020B0604030504040204" pitchFamily="34" charset="0"/>
+              </a:defRPr>
+            </a:lvl7pPr>
+            <a:lvl8pPr marL="3429000" indent="-228600" eaLnBrk="0" fontAlgn="base" hangingPunct="0">
+              <a:spcBef>
+                <a:spcPct val="0"/>
+              </a:spcBef>
+              <a:spcAft>
+                <a:spcPct val="0"/>
+              </a:spcAft>
+              <a:defRPr b="1">
+                <a:solidFill>
+                  <a:schemeClr val="tx1"/>
+                </a:solidFill>
+                <a:latin typeface="Verdana" panose="020B0604030504040204" pitchFamily="34" charset="0"/>
+              </a:defRPr>
+            </a:lvl8pPr>
+            <a:lvl9pPr marL="3886200" indent="-228600" eaLnBrk="0" fontAlgn="base" hangingPunct="0">
+              <a:spcBef>
+                <a:spcPct val="0"/>
+              </a:spcBef>
+              <a:spcAft>
+                <a:spcPct val="0"/>
+              </a:spcAft>
+              <a:defRPr b="1">
+                <a:solidFill>
+                  <a:schemeClr val="tx1"/>
+                </a:solidFill>
+                <a:latin typeface="Verdana" panose="020B0604030504040204" pitchFamily="34" charset="0"/>
+              </a:defRPr>
+            </a:lvl9pPr>
+          </a:lstStyle>
+          <a:p>
+            <a:pPr algn="ctr"/>
+            <a:r>
+              <a:rPr lang="en-US" altLang="en-US">
+                <a:solidFill>
+                  <a:srgbClr val="000000"/>
+                </a:solidFill>
+              </a:rPr>
+              <a:t>Questions? Comments?</a:t>
+            </a:r>
+          </a:p>
+          <a:p>
+            <a:pPr algn="ctr"/>
+            <a:r>
+              <a:rPr lang="en-US" altLang="en-US">
+                <a:solidFill>
+                  <a:srgbClr val="000000"/>
+                </a:solidFill>
+              </a:rPr>
+              <a:t>Dan’s e-mail: </a:t>
+            </a:r>
+            <a:r>
+              <a:rPr lang="en-US" altLang="en-US">
+                <a:solidFill>
+                  <a:srgbClr val="000000"/>
+                </a:solidFill>
+                <a:hlinkClick r:id="rId2"/>
+              </a:rPr>
+              <a:t>danc@onlc.com</a:t>
+            </a:r>
+            <a:endParaRPr lang="en-US" altLang="en-US">
+              <a:solidFill>
+                <a:srgbClr val="000000"/>
+              </a:solidFill>
+            </a:endParaRPr>
+          </a:p>
+          <a:p>
+            <a:pPr algn="ctr"/>
+            <a:r>
+              <a:rPr lang="en-US" altLang="en-US">
+                <a:solidFill>
+                  <a:srgbClr val="000000"/>
+                </a:solidFill>
+              </a:rPr>
+              <a:t>Dan’s cell #: (413) 455-0856</a:t>
+            </a:r>
+          </a:p>
+        </p:txBody>
+      </p:sp>
+      <p:sp>
+        <p:nvSpPr>
+          <p:cNvPr id="7" name="WordArt 3"/>
+          <p:cNvSpPr>
+            <a:spLocks noChangeArrowheads="1" noChangeShapeType="1" noTextEdit="1"/>
+          </p:cNvSpPr>
+          <p:nvPr/>
+        </p:nvSpPr>
+        <p:spPr bwMode="auto">
+          <a:xfrm>
+            <a:off x="254000" y="203200"/>
+            <a:ext cx="6892925" cy="2432050"/>
+          </a:xfrm>
+          <a:prstGeom prst="rect">
+            <a:avLst/>
+          </a:prstGeom>
+        </p:spPr>
+        <p:txBody>
+          <a:bodyPr wrap="none" fromWordArt="1">
+            <a:prstTxWarp prst="textCascadeUp">
+              <a:avLst>
+                <a:gd name="adj" fmla="val 44444"/>
+              </a:avLst>
+            </a:prstTxWarp>
+            <a:scene3d>
+              <a:camera prst="legacyPerspectiveFront">
+                <a:rot lat="20519989" lon="1080000" rev="0"/>
+              </a:camera>
+              <a:lightRig rig="legacyHarsh2" dir="b"/>
+            </a:scene3d>
+            <a:sp3d extrusionH="430200" prstMaterial="legacyMatte">
+              <a:extrusionClr>
+                <a:srgbClr val="FF6600"/>
+              </a:extrusionClr>
+              <a:contourClr>
+                <a:srgbClr val="FFE701"/>
+              </a:contourClr>
+            </a:sp3d>
+          </a:bodyPr>
+          <a:lstStyle/>
+          <a:p>
+            <a:pPr algn="ctr"/>
+            <a:r>
+              <a:rPr lang="en-US" sz="3600" kern="10">
+                <a:ln w="9525">
+                  <a:round/>
+                  <a:headEnd/>
+                  <a:tailEnd/>
+                </a:ln>
+                <a:gradFill rotWithShape="1">
+                  <a:gsLst>
+                    <a:gs pos="0">
+                      <a:srgbClr val="FFE701"/>
+                    </a:gs>
+                    <a:gs pos="100000">
+                      <a:srgbClr val="FE3E02"/>
+                    </a:gs>
+                  </a:gsLst>
+                  <a:lin ang="5400000" scaled="1"/>
+                </a:gradFill>
+                <a:latin typeface="Impact" panose="020B0806030902050204" pitchFamily="34" charset="0"/>
+              </a:rPr>
+              <a:t>Thank You</a:t>
+            </a:r>
+          </a:p>
+        </p:txBody>
+      </p:sp>
+      <p:sp>
+        <p:nvSpPr>
+          <p:cNvPr id="8" name="WordArt 6"/>
+          <p:cNvSpPr>
+            <a:spLocks noChangeArrowheads="1" noChangeShapeType="1" noTextEdit="1"/>
+          </p:cNvSpPr>
+          <p:nvPr/>
+        </p:nvSpPr>
+        <p:spPr bwMode="auto">
+          <a:xfrm>
+            <a:off x="8747125" y="4143375"/>
+            <a:ext cx="2628900" cy="2360613"/>
+          </a:xfrm>
+          <a:prstGeom prst="rect">
+            <a:avLst/>
+          </a:prstGeom>
+        </p:spPr>
+        <p:txBody>
+          <a:bodyPr wrap="none" fromWordArt="1">
+            <a:prstTxWarp prst="textSlantUp">
+              <a:avLst>
+                <a:gd name="adj" fmla="val 9014"/>
+              </a:avLst>
+            </a:prstTxWarp>
+          </a:bodyPr>
+          <a:lstStyle/>
+          <a:p>
+            <a:pPr algn="ctr"/>
+            <a:r>
+              <a:rPr lang="en-US" sz="3600" kern="10">
+                <a:ln w="9525">
+                  <a:solidFill>
+                    <a:srgbClr val="CC99FF"/>
+                  </a:solidFill>
+                  <a:round/>
+                  <a:headEnd/>
+                  <a:tailEnd/>
+                </a:ln>
+                <a:gradFill rotWithShape="1">
+                  <a:gsLst>
+                    <a:gs pos="0">
+                      <a:srgbClr val="6600CC"/>
+                    </a:gs>
+                    <a:gs pos="100000">
+                      <a:srgbClr val="FF0000"/>
+                    </a:gs>
+                  </a:gsLst>
+                  <a:lin ang="5400000" scaled="1"/>
+                </a:gradFill>
+                <a:effectLst>
+                  <a:outerShdw dist="53882" dir="2700000" algn="ctr" rotWithShape="0">
+                    <a:srgbClr val="9999FF">
+                      <a:alpha val="79999"/>
+                    </a:srgbClr>
+                  </a:outerShdw>
+                </a:effectLst>
+                <a:latin typeface="Impact" panose="020B0806030902050204" pitchFamily="34" charset="0"/>
+              </a:rPr>
+              <a:t>Have a</a:t>
+            </a:r>
+          </a:p>
+          <a:p>
+            <a:pPr algn="ctr"/>
+            <a:r>
+              <a:rPr lang="en-US" sz="3600" kern="10">
+                <a:ln w="9525">
+                  <a:solidFill>
+                    <a:srgbClr val="CC99FF"/>
+                  </a:solidFill>
+                  <a:round/>
+                  <a:headEnd/>
+                  <a:tailEnd/>
+                </a:ln>
+                <a:gradFill rotWithShape="1">
+                  <a:gsLst>
+                    <a:gs pos="0">
+                      <a:srgbClr val="6600CC"/>
+                    </a:gs>
+                    <a:gs pos="100000">
+                      <a:srgbClr val="FF0000"/>
+                    </a:gs>
+                  </a:gsLst>
+                  <a:lin ang="5400000" scaled="1"/>
+                </a:gradFill>
+                <a:effectLst>
+                  <a:outerShdw dist="53882" dir="2700000" algn="ctr" rotWithShape="0">
+                    <a:srgbClr val="9999FF">
+                      <a:alpha val="79999"/>
+                    </a:srgbClr>
+                  </a:outerShdw>
+                </a:effectLst>
+                <a:latin typeface="Impact" panose="020B0806030902050204" pitchFamily="34" charset="0"/>
+              </a:rPr>
+              <a:t>great weekend!</a:t>
+            </a:r>
+          </a:p>
+        </p:txBody>
+      </p:sp>
+      <p:sp>
+        <p:nvSpPr>
+          <p:cNvPr id="9" name="Rectangle 7"/>
+          <p:cNvSpPr>
+            <a:spLocks noChangeArrowheads="1"/>
+          </p:cNvSpPr>
+          <p:nvPr/>
+        </p:nvSpPr>
+        <p:spPr bwMode="auto">
+          <a:xfrm>
+            <a:off x="596900" y="3925888"/>
+            <a:ext cx="3886200" cy="434975"/>
+          </a:xfrm>
+          <a:prstGeom prst="rect">
+            <a:avLst/>
+          </a:prstGeom>
+          <a:solidFill>
+            <a:srgbClr val="FFFFFF"/>
+          </a:solidFill>
+          <a:ln w="9525" algn="ctr">
+            <a:solidFill>
+              <a:schemeClr val="bg2"/>
+            </a:solidFill>
+            <a:miter lim="800000"/>
+            <a:headEnd/>
+            <a:tailEnd/>
+          </a:ln>
+          <a:effectLst>
+            <a:outerShdw dist="53882" dir="2700000" algn="ctr" rotWithShape="0">
+              <a:srgbClr val="919191">
+                <a:alpha val="50000"/>
+              </a:srgbClr>
+            </a:outerShdw>
+          </a:effectLst>
+        </p:spPr>
+        <p:txBody>
+          <a:bodyPr wrap="none" anchor="ctr"/>
+          <a:lstStyle>
+            <a:lvl1pPr>
+              <a:defRPr b="1">
+                <a:solidFill>
+                  <a:schemeClr val="tx1"/>
+                </a:solidFill>
+                <a:latin typeface="Verdana" panose="020B0604030504040204" pitchFamily="34" charset="0"/>
+              </a:defRPr>
+            </a:lvl1pPr>
+            <a:lvl2pPr marL="742950" indent="-285750">
+              <a:defRPr b="1">
+                <a:solidFill>
+                  <a:schemeClr val="tx1"/>
+                </a:solidFill>
+                <a:latin typeface="Verdana" panose="020B0604030504040204" pitchFamily="34" charset="0"/>
+              </a:defRPr>
+            </a:lvl2pPr>
+            <a:lvl3pPr marL="1143000" indent="-228600">
+              <a:defRPr b="1">
+                <a:solidFill>
+                  <a:schemeClr val="tx1"/>
+                </a:solidFill>
+                <a:latin typeface="Verdana" panose="020B0604030504040204" pitchFamily="34" charset="0"/>
+              </a:defRPr>
+            </a:lvl3pPr>
+            <a:lvl4pPr marL="1600200" indent="-228600">
+              <a:defRPr b="1">
+                <a:solidFill>
+                  <a:schemeClr val="tx1"/>
+                </a:solidFill>
+                <a:latin typeface="Verdana" panose="020B0604030504040204" pitchFamily="34" charset="0"/>
+              </a:defRPr>
+            </a:lvl4pPr>
+            <a:lvl5pPr marL="2057400" indent="-228600">
+              <a:defRPr b="1">
+                <a:solidFill>
+                  <a:schemeClr val="tx1"/>
+                </a:solidFill>
+                <a:latin typeface="Verdana" panose="020B0604030504040204" pitchFamily="34" charset="0"/>
+              </a:defRPr>
+            </a:lvl5pPr>
+            <a:lvl6pPr marL="2514600" indent="-228600" eaLnBrk="0" fontAlgn="base" hangingPunct="0">
+              <a:spcBef>
+                <a:spcPct val="0"/>
+              </a:spcBef>
+              <a:spcAft>
+                <a:spcPct val="0"/>
+              </a:spcAft>
+              <a:defRPr b="1">
+                <a:solidFill>
+                  <a:schemeClr val="tx1"/>
+                </a:solidFill>
+                <a:latin typeface="Verdana" panose="020B0604030504040204" pitchFamily="34" charset="0"/>
+              </a:defRPr>
+            </a:lvl6pPr>
+            <a:lvl7pPr marL="2971800" indent="-228600" eaLnBrk="0" fontAlgn="base" hangingPunct="0">
+              <a:spcBef>
+                <a:spcPct val="0"/>
+              </a:spcBef>
+              <a:spcAft>
+                <a:spcPct val="0"/>
+              </a:spcAft>
+              <a:defRPr b="1">
+                <a:solidFill>
+                  <a:schemeClr val="tx1"/>
+                </a:solidFill>
+                <a:latin typeface="Verdana" panose="020B0604030504040204" pitchFamily="34" charset="0"/>
+              </a:defRPr>
+            </a:lvl7pPr>
+            <a:lvl8pPr marL="3429000" indent="-228600" eaLnBrk="0" fontAlgn="base" hangingPunct="0">
+              <a:spcBef>
+                <a:spcPct val="0"/>
+              </a:spcBef>
+              <a:spcAft>
+                <a:spcPct val="0"/>
+              </a:spcAft>
+              <a:defRPr b="1">
+                <a:solidFill>
+                  <a:schemeClr val="tx1"/>
+                </a:solidFill>
+                <a:latin typeface="Verdana" panose="020B0604030504040204" pitchFamily="34" charset="0"/>
+              </a:defRPr>
+            </a:lvl8pPr>
+            <a:lvl9pPr marL="3886200" indent="-228600" eaLnBrk="0" fontAlgn="base" hangingPunct="0">
+              <a:spcBef>
+                <a:spcPct val="0"/>
+              </a:spcBef>
+              <a:spcAft>
+                <a:spcPct val="0"/>
+              </a:spcAft>
+              <a:defRPr b="1">
+                <a:solidFill>
+                  <a:schemeClr val="tx1"/>
+                </a:solidFill>
+                <a:latin typeface="Verdana" panose="020B0604030504040204" pitchFamily="34" charset="0"/>
+              </a:defRPr>
+            </a:lvl9pPr>
+          </a:lstStyle>
+          <a:p>
+            <a:pPr algn="ctr"/>
+            <a:r>
+              <a:rPr lang="en-US" altLang="en-US">
+                <a:hlinkClick r:id="rId3"/>
+              </a:rPr>
+              <a:t>http://www.onlc.com/eval</a:t>
+            </a:r>
+            <a:endParaRPr lang="en-US" altLang="en-US"/>
+          </a:p>
+        </p:txBody>
+      </p:sp>
+      <p:pic>
+        <p:nvPicPr>
+          <p:cNvPr id="10" name="Picture 6" descr="j0305257"/>
+          <p:cNvPicPr>
+            <a:picLocks noChangeAspect="1" noChangeArrowheads="1"/>
+          </p:cNvPicPr>
+          <p:nvPr/>
+        </p:nvPicPr>
+        <p:blipFill>
+          <a:blip r:embed="rId4">
+            <a:extLst>
+              <a:ext uri="{28A0092B-C50C-407E-A947-70E740481C1C}">
+                <a14:useLocalDpi xmlns:a14="http://schemas.microsoft.com/office/drawing/2010/main" val="0"/>
+              </a:ext>
+            </a:extLst>
+          </a:blip>
+          <a:srcRect/>
+          <a:stretch>
+            <a:fillRect/>
+          </a:stretch>
+        </p:blipFill>
+        <p:spPr bwMode="auto">
+          <a:xfrm>
+            <a:off x="9812338" y="1155700"/>
+            <a:ext cx="1874837" cy="3013075"/>
+          </a:xfrm>
+          <a:prstGeom prst="rect">
+            <a:avLst/>
+          </a:prstGeom>
+          <a:noFill/>
+          <a:ln>
+            <a:noFill/>
+          </a:ln>
+          <a:extLst>
+            <a:ext uri="{909E8E84-426E-40DD-AFC4-6F175D3DCCD1}">
+              <a14:hiddenFill xmlns:a14="http://schemas.microsoft.com/office/drawing/2010/main">
+                <a:solidFill>
+                  <a:srgbClr val="FFFFFF"/>
+                </a:solidFill>
+              </a14:hiddenFill>
+            </a:ext>
+            <a:ext uri="{91240B29-F687-4F45-9708-019B960494DF}">
+              <a14:hiddenLine xmlns:a14="http://schemas.microsoft.com/office/drawing/2010/main" w="9525">
+                <a:solidFill>
+                  <a:srgbClr val="000000"/>
+                </a:solidFill>
+                <a:miter lim="800000"/>
+                <a:headEnd/>
+                <a:tailEnd/>
+              </a14:hiddenLine>
+            </a:ext>
+          </a:extLst>
+        </p:spPr>
+      </p:pic>
     </p:spTree>
     <p:extLst>
       <p:ext uri="{BB962C8B-B14F-4D97-AF65-F5344CB8AC3E}">
@@ -22247,6 +22977,13 @@
   <p:clrMapOvr>
     <a:masterClrMapping/>
   </p:clrMapOvr>
+  <p:timing>
+    <p:tnLst>
+      <p:par>
+        <p:cTn id="1" dur="indefinite" restart="never" nodeType="tmRoot"/>
+      </p:par>
+    </p:tnLst>
+  </p:timing>
 </p:sld>
 </file>
 
@@ -22308,6 +23045,32 @@
           </a:p>
         </p:txBody>
       </p:sp>
+      <p:pic>
+        <p:nvPicPr>
+          <p:cNvPr id="4" name="Picture 3">
+            <a:hlinkClick r:id="rId2"/>
+          </p:cNvPr>
+          <p:cNvPicPr>
+            <a:picLocks noChangeAspect="1"/>
+          </p:cNvPicPr>
+          <p:nvPr/>
+        </p:nvPicPr>
+        <p:blipFill>
+          <a:blip r:embed="rId3"/>
+          <a:stretch>
+            <a:fillRect/>
+          </a:stretch>
+        </p:blipFill>
+        <p:spPr>
+          <a:xfrm>
+            <a:off x="1690073" y="1371600"/>
+            <a:ext cx="8072776" cy="4529482"/>
+          </a:xfrm>
+          <a:prstGeom prst="rect">
+            <a:avLst/>
+          </a:prstGeom>
+        </p:spPr>
+      </p:pic>
     </p:spTree>
     <p:extLst>
       <p:ext uri="{BB962C8B-B14F-4D97-AF65-F5344CB8AC3E}">
@@ -22318,6 +23081,13 @@
   <p:clrMapOvr>
     <a:masterClrMapping/>
   </p:clrMapOvr>
+  <p:timing>
+    <p:tnLst>
+      <p:par>
+        <p:cTn id="1" dur="indefinite" restart="never" nodeType="tmRoot"/>
+      </p:par>
+    </p:tnLst>
+  </p:timing>
 </p:sld>
 </file>
 
@@ -22428,6 +23198,13 @@
   <p:clrMapOvr>
     <a:masterClrMapping/>
   </p:clrMapOvr>
+  <p:timing>
+    <p:tnLst>
+      <p:par>
+        <p:cTn id="1" dur="indefinite" restart="never" nodeType="tmRoot"/>
+      </p:par>
+    </p:tnLst>
+  </p:timing>
 </p:sld>
 </file>
 

</xml_diff>

<commit_message>
Added to snippets and ppt
</commit_message>
<xml_diff>
--- a/ppt/SplunkFundamentals2v1_3.pptx
+++ b/ppt/SplunkFundamentals2v1_3.pptx
@@ -4857,6 +4857,14 @@
           <a:bodyPr/>
           <a:lstStyle/>
           <a:p>
+            <a:r>
+              <a:rPr lang="en-US" dirty="0" smtClean="0"/>
+              <a:t>Supplementary </a:t>
+            </a:r>
+            <a:r>
+              <a:rPr lang="en-US" smtClean="0"/>
+              <a:t>Lab Exercises</a:t>
+            </a:r>
             <a:endParaRPr lang="en-US"/>
           </a:p>
         </p:txBody>
@@ -4884,19 +4892,41 @@
           <a:p>
             <a:r>
               <a:rPr lang="en-US" dirty="0" smtClean="0"/>
-              <a:t>P. 603</a:t>
+              <a:t>Customizing the application navigation p. 598</a:t>
             </a:r>
           </a:p>
           <a:p>
             <a:r>
               <a:rPr lang="en-US" dirty="0" smtClean="0"/>
-              <a:t>P. </a:t>
-            </a:r>
-            <a:r>
-              <a:rPr lang="en-US" smtClean="0"/>
+              <a:t>Adding a Sankey diagram p. </a:t>
+            </a:r>
+            <a:r>
+              <a:rPr lang="en-US" dirty="0" smtClean="0"/>
+              <a:t>603</a:t>
+            </a:r>
+          </a:p>
+          <a:p>
+            <a:r>
+              <a:rPr lang="en-US" dirty="0" smtClean="0"/>
+              <a:t>Remotely querying </a:t>
+            </a:r>
+            <a:r>
+              <a:rPr lang="en-US" dirty="0" err="1" smtClean="0"/>
+              <a:t>Splunk’s</a:t>
+            </a:r>
+            <a:r>
+              <a:rPr lang="en-US" dirty="0" smtClean="0"/>
+              <a:t> REST API p</a:t>
+            </a:r>
+            <a:r>
+              <a:rPr lang="en-US" dirty="0" smtClean="0"/>
+              <a:t>. </a:t>
+            </a:r>
+            <a:r>
+              <a:rPr lang="en-US" dirty="0" smtClean="0"/>
               <a:t>627</a:t>
             </a:r>
-            <a:endParaRPr lang="en-US"/>
+            <a:endParaRPr lang="en-US" dirty="0"/>
           </a:p>
         </p:txBody>
       </p:sp>
@@ -23041,13 +23071,17 @@
           <a:bodyPr/>
           <a:lstStyle/>
           <a:p>
-            <a:endParaRPr lang="en-US"/>
+            <a:r>
+              <a:rPr lang="en-US" dirty="0" smtClean="0"/>
+              <a:t>Other ways of visualizing data, packaged as apps</a:t>
+            </a:r>
+            <a:endParaRPr lang="en-US" dirty="0"/>
           </a:p>
         </p:txBody>
       </p:sp>
       <p:pic>
         <p:nvPicPr>
-          <p:cNvPr id="4" name="Picture 3">
+          <p:cNvPr id="5" name="Picture 4">
             <a:hlinkClick r:id="rId2"/>
           </p:cNvPr>
           <p:cNvPicPr>
@@ -23063,8 +23097,34 @@
         </p:blipFill>
         <p:spPr>
           <a:xfrm>
-            <a:off x="1690073" y="1371600"/>
-            <a:ext cx="8072776" cy="4529482"/>
+            <a:off x="7391400" y="757939"/>
+            <a:ext cx="3810532" cy="838317"/>
+          </a:xfrm>
+          <a:prstGeom prst="rect">
+            <a:avLst/>
+          </a:prstGeom>
+        </p:spPr>
+      </p:pic>
+      <p:pic>
+        <p:nvPicPr>
+          <p:cNvPr id="6" name="Picture 5">
+            <a:hlinkClick r:id="rId4"/>
+          </p:cNvPr>
+          <p:cNvPicPr>
+            <a:picLocks noChangeAspect="1"/>
+          </p:cNvPicPr>
+          <p:nvPr/>
+        </p:nvPicPr>
+        <p:blipFill>
+          <a:blip r:embed="rId5"/>
+          <a:stretch>
+            <a:fillRect/>
+          </a:stretch>
+        </p:blipFill>
+        <p:spPr>
+          <a:xfrm>
+            <a:off x="776438" y="2274524"/>
+            <a:ext cx="6950370" cy="3367451"/>
           </a:xfrm>
           <a:prstGeom prst="rect">
             <a:avLst/>
@@ -23153,7 +23213,25 @@
           <a:bodyPr/>
           <a:lstStyle/>
           <a:p>
-            <a:endParaRPr lang="en-US"/>
+            <a:r>
+              <a:rPr lang="en-US" dirty="0" smtClean="0"/>
+              <a:t>Standard RESTful endpoint</a:t>
+            </a:r>
+          </a:p>
+          <a:p>
+            <a:r>
+              <a:rPr lang="en-US" dirty="0" smtClean="0"/>
+              <a:t>Exposes a large amount of </a:t>
+            </a:r>
+            <a:r>
+              <a:rPr lang="en-US" dirty="0" err="1" smtClean="0"/>
+              <a:t>Splunk</a:t>
+            </a:r>
+            <a:r>
+              <a:rPr lang="en-US" dirty="0" smtClean="0"/>
+              <a:t> functionality</a:t>
+            </a:r>
+            <a:endParaRPr lang="en-US" dirty="0"/>
           </a:p>
         </p:txBody>
       </p:sp>

</xml_diff>